<commit_message>
Fix example in ai/9.3.pptx slides
Fix one code example in 9.3.pptx slide.

Signed-off-by: Juan Carlos Perez Castellanos <cuyopc@gmail.com>
</commit_message>
<xml_diff>
--- a/ai/9.3.pptx
+++ b/ai/9.3.pptx
@@ -7668,8 +7668,80 @@
               <a:buNone/>
             </a:pPr>
             <a:r>
+              <a:rPr lang="es-419" sz="2600" b="1" i="0" u="none" strike="noStrike" cap="none" dirty="0">
+                <a:solidFill>
+                  <a:srgbClr val="00FF00"/>
+                </a:solidFill>
+                <a:latin typeface="Courier New"/>
+                <a:ea typeface="Courier New"/>
+                <a:cs typeface="Courier New"/>
+                <a:sym typeface="Courier New"/>
+              </a:rPr>
+              <a:t>el</a:t>
+            </a:r>
+            <a:r>
+              <a:rPr lang="es-419" sz="2600" b="1" i="0" u="none" strike="noStrike" cap="none" dirty="0">
+                <a:solidFill>
+                  <a:srgbClr val="FFFF00"/>
+                </a:solidFill>
+                <a:latin typeface="Courier New"/>
+                <a:ea typeface="Courier New"/>
+                <a:cs typeface="Courier New"/>
+                <a:sym typeface="Courier New"/>
+              </a:rPr>
+              <a:t> payaso </a:t>
+            </a:r>
+            <a:r>
               <a:rPr lang="es-419" sz="2600" b="1" i="0" u="none" strike="noStrike" cap="none" dirty="0" err="1">
                 <a:solidFill>
+                  <a:srgbClr val="FFFF00"/>
+                </a:solidFill>
+                <a:latin typeface="Courier New"/>
+                <a:ea typeface="Courier New"/>
+                <a:cs typeface="Courier New"/>
+                <a:sym typeface="Courier New"/>
+              </a:rPr>
+              <a:t>corrio</a:t>
+            </a:r>
+            <a:r>
+              <a:rPr lang="es-419" sz="2600" b="1" i="0" u="none" strike="noStrike" cap="none" dirty="0">
+                <a:solidFill>
+                  <a:srgbClr val="FFFF00"/>
+                </a:solidFill>
+                <a:latin typeface="Courier New"/>
+                <a:ea typeface="Courier New"/>
+                <a:cs typeface="Courier New"/>
+                <a:sym typeface="Courier New"/>
+              </a:rPr>
+              <a:t> </a:t>
+            </a:r>
+            <a:r>
+              <a:rPr lang="es-419" sz="2600" b="1" i="0" u="none" strike="noStrike" cap="none" dirty="0" err="1">
+                <a:solidFill>
+                  <a:srgbClr val="FFFF00"/>
+                </a:solidFill>
+                <a:latin typeface="Courier New"/>
+                <a:ea typeface="Courier New"/>
+                <a:cs typeface="Courier New"/>
+                <a:sym typeface="Courier New"/>
+              </a:rPr>
+              <a:t>detras</a:t>
+            </a:r>
+            <a:r>
+              <a:rPr lang="es-419" sz="2600" b="1" i="0" u="none" strike="noStrike" cap="none" dirty="0">
+                <a:solidFill>
+                  <a:srgbClr val="FFFF00"/>
+                </a:solidFill>
+                <a:latin typeface="Courier New"/>
+                <a:ea typeface="Courier New"/>
+                <a:cs typeface="Courier New"/>
+                <a:sym typeface="Courier New"/>
+              </a:rPr>
+              <a:t> del carro y </a:t>
+            </a:r>
+            <a:r>
+              <a:rPr lang="es-419" sz="2600" b="1" dirty="0">
+                <a:solidFill>
                   <a:srgbClr val="00FF00"/>
                 </a:solidFill>
                 <a:latin typeface="Courier New"/>
@@ -7677,7 +7749,7 @@
                 <a:cs typeface="Courier New"/>
                 <a:sym typeface="Courier New"/>
               </a:rPr>
-              <a:t>the</a:t>
+              <a:t>el</a:t>
             </a:r>
             <a:r>
               <a:rPr lang="es-419" sz="2600" b="1" i="0" u="none" strike="noStrike" cap="none" dirty="0">
@@ -7689,7 +7761,7 @@
                 <a:cs typeface="Courier New"/>
                 <a:sym typeface="Courier New"/>
               </a:rPr>
-              <a:t> clown </a:t>
+              <a:t> carro </a:t>
             </a:r>
             <a:r>
               <a:rPr lang="es-419" sz="2600" b="1" i="0" u="none" strike="noStrike" cap="none" dirty="0" err="1">
@@ -7701,7 +7773,7 @@
                 <a:cs typeface="Courier New"/>
                 <a:sym typeface="Courier New"/>
               </a:rPr>
-              <a:t>ran</a:t>
+              <a:t>corrio</a:t>
             </a:r>
             <a:r>
               <a:rPr lang="es-419" sz="2600" b="1" i="0" u="none" strike="noStrike" cap="none" dirty="0">
@@ -7713,10 +7785,34 @@
                 <a:cs typeface="Courier New"/>
                 <a:sym typeface="Courier New"/>
               </a:rPr>
-              <a:t> after </a:t>
-            </a:r>
-            <a:r>
-              <a:rPr lang="es-419" sz="2600" b="1" i="0" u="none" strike="noStrike" cap="none" dirty="0" err="1">
+              <a:t> dentro de l</a:t>
+            </a:r>
+            <a:r>
+              <a:rPr lang="es-419" sz="2600" b="1" dirty="0">
+                <a:solidFill>
+                  <a:srgbClr val="FFFF00"/>
+                </a:solidFill>
+                <a:latin typeface="Courier New"/>
+                <a:ea typeface="Courier New"/>
+                <a:cs typeface="Courier New"/>
+                <a:sym typeface="Courier New"/>
+              </a:rPr>
+              <a:t>a tienda y la tienda cayo sobre</a:t>
+            </a:r>
+            <a:r>
+              <a:rPr lang="es-419" sz="2600" b="1" i="0" u="none" strike="noStrike" cap="none" dirty="0">
+                <a:solidFill>
+                  <a:srgbClr val="FFFF00"/>
+                </a:solidFill>
+                <a:latin typeface="Courier New"/>
+                <a:ea typeface="Courier New"/>
+                <a:cs typeface="Courier New"/>
+                <a:sym typeface="Courier New"/>
+              </a:rPr>
+              <a:t> </a:t>
+            </a:r>
+            <a:r>
+              <a:rPr lang="es-419" sz="2600" b="1" i="0" u="none" strike="noStrike" cap="none" dirty="0">
                 <a:solidFill>
                   <a:srgbClr val="00FF00"/>
                 </a:solidFill>
@@ -7725,7 +7821,7 @@
                 <a:cs typeface="Courier New"/>
                 <a:sym typeface="Courier New"/>
               </a:rPr>
-              <a:t>the</a:t>
+              <a:t>el</a:t>
             </a:r>
             <a:r>
               <a:rPr lang="es-419" sz="2600" b="1" i="0" u="none" strike="noStrike" cap="none" dirty="0">
@@ -7737,10 +7833,34 @@
                 <a:cs typeface="Courier New"/>
                 <a:sym typeface="Courier New"/>
               </a:rPr>
-              <a:t> car and </a:t>
-            </a:r>
-            <a:r>
-              <a:rPr lang="es-419" sz="2600" b="1" i="0" u="none" strike="noStrike" cap="none" dirty="0" err="1">
+              <a:t> </a:t>
+            </a:r>
+            <a:r>
+              <a:rPr lang="es-419" sz="2600" b="1" dirty="0">
+                <a:solidFill>
+                  <a:srgbClr val="FFFF00"/>
+                </a:solidFill>
+                <a:latin typeface="Courier New"/>
+                <a:ea typeface="Courier New"/>
+                <a:cs typeface="Courier New"/>
+                <a:sym typeface="Courier New"/>
+              </a:rPr>
+              <a:t>payaso y</a:t>
+            </a:r>
+            <a:r>
+              <a:rPr lang="es-419" sz="2600" b="1" i="0" u="none" strike="noStrike" cap="none" dirty="0">
+                <a:solidFill>
+                  <a:srgbClr val="FFFF00"/>
+                </a:solidFill>
+                <a:latin typeface="Courier New"/>
+                <a:ea typeface="Courier New"/>
+                <a:cs typeface="Courier New"/>
+                <a:sym typeface="Courier New"/>
+              </a:rPr>
+              <a:t> </a:t>
+            </a:r>
+            <a:r>
+              <a:rPr lang="es-419" sz="2600" b="1" dirty="0">
                 <a:solidFill>
                   <a:srgbClr val="00FF00"/>
                 </a:solidFill>
@@ -7749,7 +7869,7 @@
                 <a:cs typeface="Courier New"/>
                 <a:sym typeface="Courier New"/>
               </a:rPr>
-              <a:t>the</a:t>
+              <a:t>el</a:t>
             </a:r>
             <a:r>
               <a:rPr lang="es-419" sz="2600" b="1" i="0" u="none" strike="noStrike" cap="none" dirty="0">
@@ -7761,271 +7881,7 @@
                 <a:cs typeface="Courier New"/>
                 <a:sym typeface="Courier New"/>
               </a:rPr>
-              <a:t> car </a:t>
-            </a:r>
-            <a:r>
-              <a:rPr lang="es-419" sz="2600" b="1" i="0" u="none" strike="noStrike" cap="none" dirty="0" err="1">
-                <a:solidFill>
-                  <a:srgbClr val="FFFF00"/>
-                </a:solidFill>
-                <a:latin typeface="Courier New"/>
-                <a:ea typeface="Courier New"/>
-                <a:cs typeface="Courier New"/>
-                <a:sym typeface="Courier New"/>
-              </a:rPr>
-              <a:t>ran</a:t>
-            </a:r>
-            <a:r>
-              <a:rPr lang="es-419" sz="2600" b="1" i="0" u="none" strike="noStrike" cap="none" dirty="0">
-                <a:solidFill>
-                  <a:srgbClr val="FFFF00"/>
-                </a:solidFill>
-                <a:latin typeface="Courier New"/>
-                <a:ea typeface="Courier New"/>
-                <a:cs typeface="Courier New"/>
-                <a:sym typeface="Courier New"/>
-              </a:rPr>
-              <a:t> </a:t>
-            </a:r>
-            <a:r>
-              <a:rPr lang="es-419" sz="2600" b="1" i="0" u="none" strike="noStrike" cap="none" dirty="0" err="1">
-                <a:solidFill>
-                  <a:srgbClr val="FFFF00"/>
-                </a:solidFill>
-                <a:latin typeface="Courier New"/>
-                <a:ea typeface="Courier New"/>
-                <a:cs typeface="Courier New"/>
-                <a:sym typeface="Courier New"/>
-              </a:rPr>
-              <a:t>into</a:t>
-            </a:r>
-            <a:r>
-              <a:rPr lang="es-419" sz="2600" b="1" i="0" u="none" strike="noStrike" cap="none" dirty="0">
-                <a:solidFill>
-                  <a:srgbClr val="FFFF00"/>
-                </a:solidFill>
-                <a:latin typeface="Courier New"/>
-                <a:ea typeface="Courier New"/>
-                <a:cs typeface="Courier New"/>
-                <a:sym typeface="Courier New"/>
-              </a:rPr>
-              <a:t> </a:t>
-            </a:r>
-            <a:r>
-              <a:rPr lang="es-419" sz="2600" b="1" i="0" u="none" strike="noStrike" cap="none" dirty="0" err="1">
-                <a:solidFill>
-                  <a:srgbClr val="00FF00"/>
-                </a:solidFill>
-                <a:latin typeface="Courier New"/>
-                <a:ea typeface="Courier New"/>
-                <a:cs typeface="Courier New"/>
-                <a:sym typeface="Courier New"/>
-              </a:rPr>
-              <a:t>the</a:t>
-            </a:r>
-            <a:r>
-              <a:rPr lang="es-419" sz="2600" b="1" i="0" u="none" strike="noStrike" cap="none" dirty="0">
-                <a:solidFill>
-                  <a:srgbClr val="FFFF00"/>
-                </a:solidFill>
-                <a:latin typeface="Courier New"/>
-                <a:ea typeface="Courier New"/>
-                <a:cs typeface="Courier New"/>
-                <a:sym typeface="Courier New"/>
-              </a:rPr>
-              <a:t> </a:t>
-            </a:r>
-            <a:r>
-              <a:rPr lang="es-419" sz="2600" b="1" i="0" u="none" strike="noStrike" cap="none" dirty="0" err="1">
-                <a:solidFill>
-                  <a:srgbClr val="FFFF00"/>
-                </a:solidFill>
-                <a:latin typeface="Courier New"/>
-                <a:ea typeface="Courier New"/>
-                <a:cs typeface="Courier New"/>
-                <a:sym typeface="Courier New"/>
-              </a:rPr>
-              <a:t>tent</a:t>
-            </a:r>
-            <a:r>
-              <a:rPr lang="es-419" sz="2600" b="1" i="0" u="none" strike="noStrike" cap="none" dirty="0">
-                <a:solidFill>
-                  <a:srgbClr val="FFFF00"/>
-                </a:solidFill>
-                <a:latin typeface="Courier New"/>
-                <a:ea typeface="Courier New"/>
-                <a:cs typeface="Courier New"/>
-                <a:sym typeface="Courier New"/>
-              </a:rPr>
-              <a:t> and </a:t>
-            </a:r>
-            <a:r>
-              <a:rPr lang="es-419" sz="2600" b="1" i="0" u="none" strike="noStrike" cap="none" dirty="0" err="1">
-                <a:solidFill>
-                  <a:srgbClr val="00FF00"/>
-                </a:solidFill>
-                <a:latin typeface="Courier New"/>
-                <a:ea typeface="Courier New"/>
-                <a:cs typeface="Courier New"/>
-                <a:sym typeface="Courier New"/>
-              </a:rPr>
-              <a:t>the</a:t>
-            </a:r>
-            <a:r>
-              <a:rPr lang="es-419" sz="2600" b="1" i="0" u="none" strike="noStrike" cap="none" dirty="0">
-                <a:solidFill>
-                  <a:srgbClr val="FFFF00"/>
-                </a:solidFill>
-                <a:latin typeface="Courier New"/>
-                <a:ea typeface="Courier New"/>
-                <a:cs typeface="Courier New"/>
-                <a:sym typeface="Courier New"/>
-              </a:rPr>
-              <a:t> </a:t>
-            </a:r>
-            <a:r>
-              <a:rPr lang="es-419" sz="2600" b="1" i="0" u="none" strike="noStrike" cap="none" dirty="0" err="1">
-                <a:solidFill>
-                  <a:srgbClr val="FFFF00"/>
-                </a:solidFill>
-                <a:latin typeface="Courier New"/>
-                <a:ea typeface="Courier New"/>
-                <a:cs typeface="Courier New"/>
-                <a:sym typeface="Courier New"/>
-              </a:rPr>
-              <a:t>tent</a:t>
-            </a:r>
-            <a:r>
-              <a:rPr lang="es-419" sz="2600" b="1" i="0" u="none" strike="noStrike" cap="none" dirty="0">
-                <a:solidFill>
-                  <a:srgbClr val="FFFF00"/>
-                </a:solidFill>
-                <a:latin typeface="Courier New"/>
-                <a:ea typeface="Courier New"/>
-                <a:cs typeface="Courier New"/>
-                <a:sym typeface="Courier New"/>
-              </a:rPr>
-              <a:t> </a:t>
-            </a:r>
-            <a:r>
-              <a:rPr lang="es-419" sz="2600" b="1" i="0" u="none" strike="noStrike" cap="none" dirty="0" err="1">
-                <a:solidFill>
-                  <a:srgbClr val="FFFF00"/>
-                </a:solidFill>
-                <a:latin typeface="Courier New"/>
-                <a:ea typeface="Courier New"/>
-                <a:cs typeface="Courier New"/>
-                <a:sym typeface="Courier New"/>
-              </a:rPr>
-              <a:t>fell</a:t>
-            </a:r>
-            <a:r>
-              <a:rPr lang="es-419" sz="2600" b="1" i="0" u="none" strike="noStrike" cap="none" dirty="0">
-                <a:solidFill>
-                  <a:srgbClr val="FFFF00"/>
-                </a:solidFill>
-                <a:latin typeface="Courier New"/>
-                <a:ea typeface="Courier New"/>
-                <a:cs typeface="Courier New"/>
-                <a:sym typeface="Courier New"/>
-              </a:rPr>
-              <a:t> </a:t>
-            </a:r>
-            <a:r>
-              <a:rPr lang="es-419" sz="2600" b="1" i="0" u="none" strike="noStrike" cap="none" dirty="0" err="1">
-                <a:solidFill>
-                  <a:srgbClr val="FFFF00"/>
-                </a:solidFill>
-                <a:latin typeface="Courier New"/>
-                <a:ea typeface="Courier New"/>
-                <a:cs typeface="Courier New"/>
-                <a:sym typeface="Courier New"/>
-              </a:rPr>
-              <a:t>down</a:t>
-            </a:r>
-            <a:r>
-              <a:rPr lang="es-419" sz="2600" b="1" i="0" u="none" strike="noStrike" cap="none" dirty="0">
-                <a:solidFill>
-                  <a:srgbClr val="FFFF00"/>
-                </a:solidFill>
-                <a:latin typeface="Courier New"/>
-                <a:ea typeface="Courier New"/>
-                <a:cs typeface="Courier New"/>
-                <a:sym typeface="Courier New"/>
-              </a:rPr>
-              <a:t> </a:t>
-            </a:r>
-            <a:r>
-              <a:rPr lang="es-419" sz="2600" b="1" i="0" u="none" strike="noStrike" cap="none" dirty="0" err="1">
-                <a:solidFill>
-                  <a:srgbClr val="FFFF00"/>
-                </a:solidFill>
-                <a:latin typeface="Courier New"/>
-                <a:ea typeface="Courier New"/>
-                <a:cs typeface="Courier New"/>
-                <a:sym typeface="Courier New"/>
-              </a:rPr>
-              <a:t>on</a:t>
-            </a:r>
-            <a:r>
-              <a:rPr lang="es-419" sz="2600" b="1" i="0" u="none" strike="noStrike" cap="none" dirty="0">
-                <a:solidFill>
-                  <a:srgbClr val="FFFF00"/>
-                </a:solidFill>
-                <a:latin typeface="Courier New"/>
-                <a:ea typeface="Courier New"/>
-                <a:cs typeface="Courier New"/>
-                <a:sym typeface="Courier New"/>
-              </a:rPr>
-              <a:t> </a:t>
-            </a:r>
-            <a:r>
-              <a:rPr lang="es-419" sz="2600" b="1" i="0" u="none" strike="noStrike" cap="none" dirty="0" err="1">
-                <a:solidFill>
-                  <a:srgbClr val="00FF00"/>
-                </a:solidFill>
-                <a:latin typeface="Courier New"/>
-                <a:ea typeface="Courier New"/>
-                <a:cs typeface="Courier New"/>
-                <a:sym typeface="Courier New"/>
-              </a:rPr>
-              <a:t>the</a:t>
-            </a:r>
-            <a:r>
-              <a:rPr lang="es-419" sz="2600" b="1" i="0" u="none" strike="noStrike" cap="none" dirty="0">
-                <a:solidFill>
-                  <a:srgbClr val="FFFF00"/>
-                </a:solidFill>
-                <a:latin typeface="Courier New"/>
-                <a:ea typeface="Courier New"/>
-                <a:cs typeface="Courier New"/>
-                <a:sym typeface="Courier New"/>
-              </a:rPr>
-              <a:t> clown and </a:t>
-            </a:r>
-            <a:r>
-              <a:rPr lang="es-419" sz="2600" b="1" i="0" u="none" strike="noStrike" cap="none" dirty="0" err="1">
-                <a:solidFill>
-                  <a:srgbClr val="00FF00"/>
-                </a:solidFill>
-                <a:latin typeface="Courier New"/>
-                <a:ea typeface="Courier New"/>
-                <a:cs typeface="Courier New"/>
-                <a:sym typeface="Courier New"/>
-              </a:rPr>
-              <a:t>the</a:t>
-            </a:r>
-            <a:r>
-              <a:rPr lang="es-419" sz="2600" b="1" i="0" u="none" strike="noStrike" cap="none" dirty="0">
-                <a:solidFill>
-                  <a:srgbClr val="FFFF00"/>
-                </a:solidFill>
-                <a:latin typeface="Courier New"/>
-                <a:ea typeface="Courier New"/>
-                <a:cs typeface="Courier New"/>
-                <a:sym typeface="Courier New"/>
-              </a:rPr>
-              <a:t> car </a:t>
+              <a:t> carro </a:t>
             </a:r>
           </a:p>
           <a:p>
@@ -12229,7 +12085,7 @@
               <a:buNone/>
             </a:pPr>
             <a:r>
-              <a:rPr lang="es-419" sz="2400" b="1" i="0" u="none" strike="noStrike" cap="none">
+              <a:rPr lang="es-419" sz="2400" b="1" i="0" u="none" strike="noStrike" cap="none" dirty="0" err="1">
                 <a:solidFill>
                   <a:srgbClr val="00FF00"/>
                 </a:solidFill>
@@ -12241,16 +12097,88 @@
               <a:t>jjj</a:t>
             </a:r>
             <a:r>
-              <a:rPr lang="es-419" sz="2400" b="1" i="0" u="none" strike="noStrike" cap="none">
-                <a:solidFill>
-                  <a:schemeClr val="lt1"/>
-                </a:solidFill>
-                <a:latin typeface="Courier New"/>
-                <a:ea typeface="Courier New"/>
-                <a:cs typeface="Courier New"/>
-                <a:sym typeface="Courier New"/>
-              </a:rPr>
-              <a:t> = { 'chuck' : 1 , 'fred' : 42, 'jan': 100}</a:t>
+              <a:rPr lang="es-419" sz="2400" b="1" i="0" u="none" strike="noStrike" cap="none" dirty="0">
+                <a:solidFill>
+                  <a:schemeClr val="lt1"/>
+                </a:solidFill>
+                <a:latin typeface="Courier New"/>
+                <a:ea typeface="Courier New"/>
+                <a:cs typeface="Courier New"/>
+                <a:sym typeface="Courier New"/>
+              </a:rPr>
+              <a:t> = { '</a:t>
+            </a:r>
+            <a:r>
+              <a:rPr lang="es-419" sz="2400" b="1" i="0" u="none" strike="noStrike" cap="none" dirty="0" err="1">
+                <a:solidFill>
+                  <a:schemeClr val="lt1"/>
+                </a:solidFill>
+                <a:latin typeface="Courier New"/>
+                <a:ea typeface="Courier New"/>
+                <a:cs typeface="Courier New"/>
+                <a:sym typeface="Courier New"/>
+              </a:rPr>
+              <a:t>chuck</a:t>
+            </a:r>
+            <a:r>
+              <a:rPr lang="es-419" sz="2400" b="1" i="0" u="none" strike="noStrike" cap="none" dirty="0">
+                <a:solidFill>
+                  <a:schemeClr val="lt1"/>
+                </a:solidFill>
+                <a:latin typeface="Courier New"/>
+                <a:ea typeface="Courier New"/>
+                <a:cs typeface="Courier New"/>
+                <a:sym typeface="Courier New"/>
+              </a:rPr>
+              <a:t>' : 1 , '</a:t>
+            </a:r>
+            <a:r>
+              <a:rPr lang="es-419" sz="2400" b="1" i="0" u="none" strike="noStrike" cap="none" dirty="0" err="1">
+                <a:solidFill>
+                  <a:schemeClr val="lt1"/>
+                </a:solidFill>
+                <a:latin typeface="Courier New"/>
+                <a:ea typeface="Courier New"/>
+                <a:cs typeface="Courier New"/>
+                <a:sym typeface="Courier New"/>
+              </a:rPr>
+              <a:t>fred</a:t>
+            </a:r>
+            <a:r>
+              <a:rPr lang="es-419" sz="2400" b="1" i="0" u="none" strike="noStrike" cap="none" dirty="0">
+                <a:solidFill>
+                  <a:schemeClr val="lt1"/>
+                </a:solidFill>
+                <a:latin typeface="Courier New"/>
+                <a:ea typeface="Courier New"/>
+                <a:cs typeface="Courier New"/>
+                <a:sym typeface="Courier New"/>
+              </a:rPr>
+              <a:t>' : 42, '</a:t>
+            </a:r>
+            <a:r>
+              <a:rPr lang="es-419" sz="2400" b="1" i="0" u="none" strike="noStrike" cap="none" dirty="0" err="1">
+                <a:solidFill>
+                  <a:schemeClr val="lt1"/>
+                </a:solidFill>
+                <a:latin typeface="Courier New"/>
+                <a:ea typeface="Courier New"/>
+                <a:cs typeface="Courier New"/>
+                <a:sym typeface="Courier New"/>
+              </a:rPr>
+              <a:t>jan</a:t>
+            </a:r>
+            <a:r>
+              <a:rPr lang="es-419" sz="2400" b="1" i="0" u="none" strike="noStrike" cap="none" dirty="0">
+                <a:solidFill>
+                  <a:schemeClr val="lt1"/>
+                </a:solidFill>
+                <a:latin typeface="Courier New"/>
+                <a:ea typeface="Courier New"/>
+                <a:cs typeface="Courier New"/>
+                <a:sym typeface="Courier New"/>
+              </a:rPr>
+              <a:t>': 100}</a:t>
             </a:r>
           </a:p>
           <a:p>
@@ -12272,19 +12200,31 @@
               <a:buNone/>
             </a:pPr>
             <a:r>
-              <a:rPr lang="es-419" sz="2400" b="1" i="0" u="none" strike="noStrike" cap="none">
-                <a:solidFill>
-                  <a:schemeClr val="lt1"/>
-                </a:solidFill>
-                <a:latin typeface="Courier New"/>
-                <a:ea typeface="Courier New"/>
-                <a:cs typeface="Courier New"/>
-                <a:sym typeface="Courier New"/>
-              </a:rPr>
-              <a:t>for </a:t>
-            </a:r>
-            <a:r>
-              <a:rPr lang="es-419" sz="2400" b="1" i="0" u="none" strike="noStrike" cap="none">
+              <a:rPr lang="es-419" sz="2400" b="1" i="0" u="none" strike="noStrike" cap="none" dirty="0" err="1">
+                <a:solidFill>
+                  <a:schemeClr val="lt1"/>
+                </a:solidFill>
+                <a:latin typeface="Courier New"/>
+                <a:ea typeface="Courier New"/>
+                <a:cs typeface="Courier New"/>
+                <a:sym typeface="Courier New"/>
+              </a:rPr>
+              <a:t>for</a:t>
+            </a:r>
+            <a:r>
+              <a:rPr lang="es-419" sz="2400" b="1" i="0" u="none" strike="noStrike" cap="none" dirty="0">
+                <a:solidFill>
+                  <a:schemeClr val="lt1"/>
+                </a:solidFill>
+                <a:latin typeface="Courier New"/>
+                <a:ea typeface="Courier New"/>
+                <a:cs typeface="Courier New"/>
+                <a:sym typeface="Courier New"/>
+              </a:rPr>
+              <a:t> </a:t>
+            </a:r>
+            <a:r>
+              <a:rPr lang="es-419" sz="2400" b="1" i="0" u="none" strike="noStrike" cap="none" dirty="0" err="1">
                 <a:solidFill>
                   <a:srgbClr val="FF7F00"/>
                 </a:solidFill>
@@ -12296,7 +12236,7 @@
               <a:t>aaa</a:t>
             </a:r>
             <a:r>
-              <a:rPr lang="es-419" sz="2400" b="1" i="0" u="none" strike="noStrike" cap="none">
+              <a:rPr lang="es-419" sz="2400" b="1" i="0" u="none" strike="noStrike" cap="none" dirty="0" err="1">
                 <a:solidFill>
                   <a:schemeClr val="lt1"/>
                 </a:solidFill>
@@ -12308,7 +12248,7 @@
               <a:t>,</a:t>
             </a:r>
             <a:r>
-              <a:rPr lang="es-419" sz="2400" b="1" i="0" u="none" strike="noStrike" cap="none">
+              <a:rPr lang="es-419" sz="2400" b="1" i="0" u="none" strike="noStrike" cap="none" dirty="0" err="1">
                 <a:solidFill>
                   <a:srgbClr val="FFFF00"/>
                 </a:solidFill>
@@ -12320,7 +12260,7 @@
               <a:t>bbb</a:t>
             </a:r>
             <a:r>
-              <a:rPr lang="es-419" sz="2400" b="1" i="0" u="none" strike="noStrike" cap="none">
+              <a:rPr lang="es-419" sz="2400" b="1" i="0" u="none" strike="noStrike" cap="none" dirty="0">
                 <a:solidFill>
                   <a:schemeClr val="lt1"/>
                 </a:solidFill>
@@ -12332,7 +12272,7 @@
               <a:t> in </a:t>
             </a:r>
             <a:r>
-              <a:rPr lang="es-419" sz="2400" b="1" i="0" u="none" strike="noStrike" cap="none">
+              <a:rPr lang="es-419" sz="2400" b="1" i="0" u="none" strike="noStrike" cap="none" dirty="0" err="1">
                 <a:solidFill>
                   <a:srgbClr val="00FF00"/>
                 </a:solidFill>
@@ -12344,7 +12284,7 @@
               <a:t>jjj</a:t>
             </a:r>
             <a:r>
-              <a:rPr lang="es-419" sz="2400" b="1" i="0" u="none" strike="noStrike" cap="none">
+              <a:rPr lang="es-419" sz="2400" b="1" i="0" u="none" strike="noStrike" cap="none" dirty="0" err="1">
                 <a:solidFill>
                   <a:srgbClr val="FF00FF"/>
                 </a:solidFill>
@@ -12356,7 +12296,7 @@
               <a:t>.items</a:t>
             </a:r>
             <a:r>
-              <a:rPr lang="es-419" sz="2400" b="1" i="0" u="none" strike="noStrike" cap="none">
+              <a:rPr lang="es-419" sz="2400" b="1" i="0" u="none" strike="noStrike" cap="none" dirty="0">
                 <a:solidFill>
                   <a:schemeClr val="lt1"/>
                 </a:solidFill>
@@ -12376,19 +12316,43 @@
               <a:buSzPct val="25000"/>
             </a:pPr>
             <a:r>
-              <a:rPr lang="es-419" sz="2400" b="1" i="0" u="none" strike="noStrike" cap="none">
-                <a:solidFill>
-                  <a:schemeClr val="lt1"/>
-                </a:solidFill>
-                <a:latin typeface="Courier New"/>
-                <a:ea typeface="Courier New"/>
-                <a:cs typeface="Courier New"/>
-                <a:sym typeface="Courier New"/>
-              </a:rPr>
-              <a:t>    print(</a:t>
-            </a:r>
-            <a:r>
-              <a:rPr lang="es-419" sz="2400" b="1" i="0" u="none" strike="noStrike" cap="none">
+              <a:rPr lang="es-419" sz="2400" b="1" i="0" u="none" strike="noStrike" cap="none" dirty="0">
+                <a:solidFill>
+                  <a:schemeClr val="lt1"/>
+                </a:solidFill>
+                <a:latin typeface="Courier New"/>
+                <a:ea typeface="Courier New"/>
+                <a:cs typeface="Courier New"/>
+                <a:sym typeface="Courier New"/>
+              </a:rPr>
+              <a:t>    </a:t>
+            </a:r>
+            <a:r>
+              <a:rPr lang="es-419" sz="2400" b="1" i="0" u="none" strike="noStrike" cap="none" dirty="0" err="1">
+                <a:solidFill>
+                  <a:schemeClr val="lt1"/>
+                </a:solidFill>
+                <a:latin typeface="Courier New"/>
+                <a:ea typeface="Courier New"/>
+                <a:cs typeface="Courier New"/>
+                <a:sym typeface="Courier New"/>
+              </a:rPr>
+              <a:t>print</a:t>
+            </a:r>
+            <a:r>
+              <a:rPr lang="es-419" sz="2400" b="1" i="0" u="none" strike="noStrike" cap="none" dirty="0">
+                <a:solidFill>
+                  <a:schemeClr val="lt1"/>
+                </a:solidFill>
+                <a:latin typeface="Courier New"/>
+                <a:ea typeface="Courier New"/>
+                <a:cs typeface="Courier New"/>
+                <a:sym typeface="Courier New"/>
+              </a:rPr>
+              <a:t>(</a:t>
+            </a:r>
+            <a:r>
+              <a:rPr lang="es-419" sz="2400" b="1" i="0" u="none" strike="noStrike" cap="none" dirty="0" err="1">
                 <a:solidFill>
                   <a:srgbClr val="FF7F00"/>
                 </a:solidFill>
@@ -12400,7 +12364,7 @@
               <a:t>aaa</a:t>
             </a:r>
             <a:r>
-              <a:rPr lang="es-419" sz="2400" b="1" i="0" u="none" strike="noStrike" cap="none">
+              <a:rPr lang="es-419" sz="2400" b="1" i="0" u="none" strike="noStrike" cap="none" dirty="0">
                 <a:solidFill>
                   <a:schemeClr val="lt1"/>
                 </a:solidFill>
@@ -12412,7 +12376,7 @@
               <a:t>, </a:t>
             </a:r>
             <a:r>
-              <a:rPr lang="es-419" sz="2400" b="1" i="0" u="none" strike="noStrike" cap="none">
+              <a:rPr lang="es-419" sz="2400" b="1" i="0" u="none" strike="noStrike" cap="none" dirty="0" err="1">
                 <a:solidFill>
                   <a:srgbClr val="FFFF00"/>
                 </a:solidFill>
@@ -12424,7 +12388,7 @@
               <a:t>bbb</a:t>
             </a:r>
             <a:r>
-              <a:rPr lang="es-419" sz="2400" b="1">
+              <a:rPr lang="es-419" sz="2400" b="1" dirty="0">
                 <a:solidFill>
                   <a:schemeClr val="lt1"/>
                 </a:solidFill>
@@ -12435,7 +12399,7 @@
               </a:rPr>
               <a:t>)</a:t>
             </a:r>
-            <a:endParaRPr lang="es-419" sz="2400" b="1" i="0" u="none" strike="noStrike" cap="none">
+            <a:endParaRPr lang="es-419" sz="2400" b="1" i="0" u="none" strike="noStrike" cap="none" dirty="0">
               <a:solidFill>
                 <a:srgbClr val="FFFF00"/>
               </a:solidFill>
@@ -12463,7 +12427,7 @@
               <a:buFont typeface="Cabin"/>
               <a:buNone/>
             </a:pPr>
-            <a:endParaRPr lang="es-419" sz="2400" b="1" i="0" u="none" strike="noStrike" cap="none">
+            <a:endParaRPr lang="es-419" sz="2400" b="1" i="0" u="none" strike="noStrike" cap="none" dirty="0">
               <a:solidFill>
                 <a:schemeClr val="lt1"/>
               </a:solidFill>
@@ -12491,7 +12455,7 @@
               <a:buFont typeface="Cabin"/>
               <a:buNone/>
             </a:pPr>
-            <a:endParaRPr lang="es-419" sz="2400" b="1">
+            <a:endParaRPr lang="es-419" sz="2400" b="1" dirty="0">
               <a:solidFill>
                 <a:schemeClr val="lt1"/>
               </a:solidFill>
@@ -12520,7 +12484,7 @@
               <a:buNone/>
             </a:pPr>
             <a:r>
-              <a:rPr lang="es-419" sz="2400" b="1" i="0" u="none" strike="noStrike" cap="none">
+              <a:rPr lang="es-419" sz="2400" b="1" i="0" u="none" strike="noStrike" cap="none" dirty="0">
                 <a:solidFill>
                   <a:schemeClr val="lt1"/>
                 </a:solidFill>
@@ -12551,7 +12515,7 @@
               <a:buNone/>
             </a:pPr>
             <a:r>
-              <a:rPr lang="es-419" sz="2400" b="1" i="0" u="none" strike="noStrike" cap="none">
+              <a:rPr lang="es-419" sz="2400" b="1" i="0" u="none" strike="noStrike" cap="none" dirty="0" err="1">
                 <a:solidFill>
                   <a:srgbClr val="FF7F00"/>
                 </a:solidFill>
@@ -12563,7 +12527,7 @@
               <a:t>jan</a:t>
             </a:r>
             <a:r>
-              <a:rPr lang="es-419" sz="2400" b="1" i="0" u="none" strike="noStrike" cap="none">
+              <a:rPr lang="es-419" sz="2400" b="1" i="0" u="none" strike="noStrike" cap="none" dirty="0">
                 <a:solidFill>
                   <a:srgbClr val="FFFF00"/>
                 </a:solidFill>
@@ -12594,7 +12558,7 @@
               <a:buNone/>
             </a:pPr>
             <a:r>
-              <a:rPr lang="es-419" sz="2400" b="1" i="0" u="none" strike="noStrike" cap="none">
+              <a:rPr lang="es-419" sz="2400" b="1" i="0" u="none" strike="noStrike" cap="none" dirty="0" err="1">
                 <a:solidFill>
                   <a:srgbClr val="FF7F00"/>
                 </a:solidFill>
@@ -12606,7 +12570,7 @@
               <a:t>chuck</a:t>
             </a:r>
             <a:r>
-              <a:rPr lang="es-419" sz="2400" b="1" i="0" u="none" strike="noStrike" cap="none">
+              <a:rPr lang="es-419" sz="2400" b="1" i="0" u="none" strike="noStrike" cap="none" dirty="0">
                 <a:solidFill>
                   <a:srgbClr val="FFFF00"/>
                 </a:solidFill>
@@ -12637,7 +12601,7 @@
               <a:buNone/>
             </a:pPr>
             <a:r>
-              <a:rPr lang="es-419" sz="2400" b="1" i="0" u="none" strike="noStrike" cap="none">
+              <a:rPr lang="es-419" sz="2400" b="1" i="0" u="none" strike="noStrike" cap="none" dirty="0" err="1">
                 <a:solidFill>
                   <a:srgbClr val="FF7F00"/>
                 </a:solidFill>
@@ -12649,7 +12613,7 @@
               <a:t>fred</a:t>
             </a:r>
             <a:r>
-              <a:rPr lang="es-419" sz="2400" b="1" i="0" u="none" strike="noStrike" cap="none">
+              <a:rPr lang="es-419" sz="2400" b="1" i="0" u="none" strike="noStrike" cap="none" dirty="0">
                 <a:solidFill>
                   <a:srgbClr val="FFFF00"/>
                 </a:solidFill>
@@ -12680,7 +12644,7 @@
               <a:buNone/>
             </a:pPr>
             <a:r>
-              <a:rPr lang="es-419" sz="2400" b="1" i="0" u="none" strike="noStrike" cap="none">
+              <a:rPr lang="es-419" sz="2400" b="1" i="0" u="none" strike="noStrike" cap="none" dirty="0">
                 <a:solidFill>
                   <a:schemeClr val="lt1"/>
                 </a:solidFill>
@@ -12705,7 +12669,7 @@
               </a:spcAft>
               <a:buNone/>
             </a:pPr>
-            <a:endParaRPr lang="es-419" sz="2400" b="1">
+            <a:endParaRPr lang="es-419" sz="2400" b="1" dirty="0">
               <a:latin typeface="Courier New"/>
               <a:ea typeface="Courier New"/>
               <a:cs typeface="Courier New"/>

</xml_diff>